<commit_message>
Bug fixes from David and Robin
</commit_message>
<xml_diff>
--- a/_website/assets/help.pptx
+++ b/_website/assets/help.pptx
@@ -267,7 +267,7 @@
           <a:p>
             <a:fld id="{3663C3D6-43F3-4C05-88AF-E7C795497FD0}" type="datetimeFigureOut">
               <a:rPr lang="en-CA" smtClean="0"/>
-              <a:t>2019-05-18</a:t>
+              <a:t>2019-06-05</a:t>
             </a:fld>
             <a:endParaRPr lang="en-CA"/>
           </a:p>
@@ -437,7 +437,7 @@
           <a:p>
             <a:fld id="{3663C3D6-43F3-4C05-88AF-E7C795497FD0}" type="datetimeFigureOut">
               <a:rPr lang="en-CA" smtClean="0"/>
-              <a:t>2019-05-18</a:t>
+              <a:t>2019-06-05</a:t>
             </a:fld>
             <a:endParaRPr lang="en-CA"/>
           </a:p>
@@ -617,7 +617,7 @@
           <a:p>
             <a:fld id="{3663C3D6-43F3-4C05-88AF-E7C795497FD0}" type="datetimeFigureOut">
               <a:rPr lang="en-CA" smtClean="0"/>
-              <a:t>2019-05-18</a:t>
+              <a:t>2019-06-05</a:t>
             </a:fld>
             <a:endParaRPr lang="en-CA"/>
           </a:p>
@@ -787,7 +787,7 @@
           <a:p>
             <a:fld id="{3663C3D6-43F3-4C05-88AF-E7C795497FD0}" type="datetimeFigureOut">
               <a:rPr lang="en-CA" smtClean="0"/>
-              <a:t>2019-05-18</a:t>
+              <a:t>2019-06-05</a:t>
             </a:fld>
             <a:endParaRPr lang="en-CA"/>
           </a:p>
@@ -1033,7 +1033,7 @@
           <a:p>
             <a:fld id="{3663C3D6-43F3-4C05-88AF-E7C795497FD0}" type="datetimeFigureOut">
               <a:rPr lang="en-CA" smtClean="0"/>
-              <a:t>2019-05-18</a:t>
+              <a:t>2019-06-05</a:t>
             </a:fld>
             <a:endParaRPr lang="en-CA"/>
           </a:p>
@@ -1265,7 +1265,7 @@
           <a:p>
             <a:fld id="{3663C3D6-43F3-4C05-88AF-E7C795497FD0}" type="datetimeFigureOut">
               <a:rPr lang="en-CA" smtClean="0"/>
-              <a:t>2019-05-18</a:t>
+              <a:t>2019-06-05</a:t>
             </a:fld>
             <a:endParaRPr lang="en-CA"/>
           </a:p>
@@ -1632,7 +1632,7 @@
           <a:p>
             <a:fld id="{3663C3D6-43F3-4C05-88AF-E7C795497FD0}" type="datetimeFigureOut">
               <a:rPr lang="en-CA" smtClean="0"/>
-              <a:t>2019-05-18</a:t>
+              <a:t>2019-06-05</a:t>
             </a:fld>
             <a:endParaRPr lang="en-CA"/>
           </a:p>
@@ -1750,7 +1750,7 @@
           <a:p>
             <a:fld id="{3663C3D6-43F3-4C05-88AF-E7C795497FD0}" type="datetimeFigureOut">
               <a:rPr lang="en-CA" smtClean="0"/>
-              <a:t>2019-05-18</a:t>
+              <a:t>2019-06-05</a:t>
             </a:fld>
             <a:endParaRPr lang="en-CA"/>
           </a:p>
@@ -1845,7 +1845,7 @@
           <a:p>
             <a:fld id="{3663C3D6-43F3-4C05-88AF-E7C795497FD0}" type="datetimeFigureOut">
               <a:rPr lang="en-CA" smtClean="0"/>
-              <a:t>2019-05-18</a:t>
+              <a:t>2019-06-05</a:t>
             </a:fld>
             <a:endParaRPr lang="en-CA"/>
           </a:p>
@@ -2122,7 +2122,7 @@
           <a:p>
             <a:fld id="{3663C3D6-43F3-4C05-88AF-E7C795497FD0}" type="datetimeFigureOut">
               <a:rPr lang="en-CA" smtClean="0"/>
-              <a:t>2019-05-18</a:t>
+              <a:t>2019-06-05</a:t>
             </a:fld>
             <a:endParaRPr lang="en-CA"/>
           </a:p>
@@ -2379,7 +2379,7 @@
           <a:p>
             <a:fld id="{3663C3D6-43F3-4C05-88AF-E7C795497FD0}" type="datetimeFigureOut">
               <a:rPr lang="en-CA" smtClean="0"/>
-              <a:t>2019-05-18</a:t>
+              <a:t>2019-06-05</a:t>
             </a:fld>
             <a:endParaRPr lang="en-CA"/>
           </a:p>
@@ -2592,7 +2592,7 @@
           <a:p>
             <a:fld id="{3663C3D6-43F3-4C05-88AF-E7C795497FD0}" type="datetimeFigureOut">
               <a:rPr lang="en-CA" smtClean="0"/>
-              <a:t>2019-05-18</a:t>
+              <a:t>2019-06-05</a:t>
             </a:fld>
             <a:endParaRPr lang="en-CA"/>
           </a:p>
@@ -3855,8 +3855,12 @@
                 <a:latin typeface="Roboto Slab" pitchFamily="2" charset="0"/>
                 <a:ea typeface="Roboto Slab" pitchFamily="2" charset="0"/>
               </a:rPr>
-              <a:t>Time navigation</a:t>
-            </a:r>
+              <a:t>Mission Navigator</a:t>
+            </a:r>
+            <a:endParaRPr lang="en-CA" dirty="0" smtClean="0">
+              <a:latin typeface="Roboto Slab" pitchFamily="2" charset="0"/>
+              <a:ea typeface="Roboto Slab" pitchFamily="2" charset="0"/>
+            </a:endParaRPr>
           </a:p>
           <a:p>
             <a:pPr algn="ctr"/>

</xml_diff>

<commit_message>
Many bug fixes. Mobile fixes. Blended launch vid. GA updates.
</commit_message>
<xml_diff>
--- a/_website/assets/help.pptx
+++ b/_website/assets/help.pptx
@@ -267,7 +267,7 @@
           <a:p>
             <a:fld id="{3663C3D6-43F3-4C05-88AF-E7C795497FD0}" type="datetimeFigureOut">
               <a:rPr lang="en-CA" smtClean="0"/>
-              <a:t>2019-06-05</a:t>
+              <a:t>2019-06-08</a:t>
             </a:fld>
             <a:endParaRPr lang="en-CA"/>
           </a:p>
@@ -437,7 +437,7 @@
           <a:p>
             <a:fld id="{3663C3D6-43F3-4C05-88AF-E7C795497FD0}" type="datetimeFigureOut">
               <a:rPr lang="en-CA" smtClean="0"/>
-              <a:t>2019-06-05</a:t>
+              <a:t>2019-06-08</a:t>
             </a:fld>
             <a:endParaRPr lang="en-CA"/>
           </a:p>
@@ -617,7 +617,7 @@
           <a:p>
             <a:fld id="{3663C3D6-43F3-4C05-88AF-E7C795497FD0}" type="datetimeFigureOut">
               <a:rPr lang="en-CA" smtClean="0"/>
-              <a:t>2019-06-05</a:t>
+              <a:t>2019-06-08</a:t>
             </a:fld>
             <a:endParaRPr lang="en-CA"/>
           </a:p>
@@ -787,7 +787,7 @@
           <a:p>
             <a:fld id="{3663C3D6-43F3-4C05-88AF-E7C795497FD0}" type="datetimeFigureOut">
               <a:rPr lang="en-CA" smtClean="0"/>
-              <a:t>2019-06-05</a:t>
+              <a:t>2019-06-08</a:t>
             </a:fld>
             <a:endParaRPr lang="en-CA"/>
           </a:p>
@@ -1033,7 +1033,7 @@
           <a:p>
             <a:fld id="{3663C3D6-43F3-4C05-88AF-E7C795497FD0}" type="datetimeFigureOut">
               <a:rPr lang="en-CA" smtClean="0"/>
-              <a:t>2019-06-05</a:t>
+              <a:t>2019-06-08</a:t>
             </a:fld>
             <a:endParaRPr lang="en-CA"/>
           </a:p>
@@ -1265,7 +1265,7 @@
           <a:p>
             <a:fld id="{3663C3D6-43F3-4C05-88AF-E7C795497FD0}" type="datetimeFigureOut">
               <a:rPr lang="en-CA" smtClean="0"/>
-              <a:t>2019-06-05</a:t>
+              <a:t>2019-06-08</a:t>
             </a:fld>
             <a:endParaRPr lang="en-CA"/>
           </a:p>
@@ -1632,7 +1632,7 @@
           <a:p>
             <a:fld id="{3663C3D6-43F3-4C05-88AF-E7C795497FD0}" type="datetimeFigureOut">
               <a:rPr lang="en-CA" smtClean="0"/>
-              <a:t>2019-06-05</a:t>
+              <a:t>2019-06-08</a:t>
             </a:fld>
             <a:endParaRPr lang="en-CA"/>
           </a:p>
@@ -1750,7 +1750,7 @@
           <a:p>
             <a:fld id="{3663C3D6-43F3-4C05-88AF-E7C795497FD0}" type="datetimeFigureOut">
               <a:rPr lang="en-CA" smtClean="0"/>
-              <a:t>2019-06-05</a:t>
+              <a:t>2019-06-08</a:t>
             </a:fld>
             <a:endParaRPr lang="en-CA"/>
           </a:p>
@@ -1845,7 +1845,7 @@
           <a:p>
             <a:fld id="{3663C3D6-43F3-4C05-88AF-E7C795497FD0}" type="datetimeFigureOut">
               <a:rPr lang="en-CA" smtClean="0"/>
-              <a:t>2019-06-05</a:t>
+              <a:t>2019-06-08</a:t>
             </a:fld>
             <a:endParaRPr lang="en-CA"/>
           </a:p>
@@ -2122,7 +2122,7 @@
           <a:p>
             <a:fld id="{3663C3D6-43F3-4C05-88AF-E7C795497FD0}" type="datetimeFigureOut">
               <a:rPr lang="en-CA" smtClean="0"/>
-              <a:t>2019-06-05</a:t>
+              <a:t>2019-06-08</a:t>
             </a:fld>
             <a:endParaRPr lang="en-CA"/>
           </a:p>
@@ -2379,7 +2379,7 @@
           <a:p>
             <a:fld id="{3663C3D6-43F3-4C05-88AF-E7C795497FD0}" type="datetimeFigureOut">
               <a:rPr lang="en-CA" smtClean="0"/>
-              <a:t>2019-06-05</a:t>
+              <a:t>2019-06-08</a:t>
             </a:fld>
             <a:endParaRPr lang="en-CA"/>
           </a:p>
@@ -2592,7 +2592,7 @@
           <a:p>
             <a:fld id="{3663C3D6-43F3-4C05-88AF-E7C795497FD0}" type="datetimeFigureOut">
               <a:rPr lang="en-CA" smtClean="0"/>
-              <a:t>2019-06-05</a:t>
+              <a:t>2019-06-08</a:t>
             </a:fld>
             <a:endParaRPr lang="en-CA"/>
           </a:p>
@@ -3007,7 +3007,7 @@
       </p:grpSpPr>
       <p:pic>
         <p:nvPicPr>
-          <p:cNvPr id="5" name="Picture 4"/>
+          <p:cNvPr id="3" name="Picture 2"/>
           <p:cNvPicPr>
             <a:picLocks noChangeAspect="1"/>
           </p:cNvPicPr>
@@ -3021,8 +3021,8 @@
         </p:blipFill>
         <p:spPr>
           <a:xfrm>
-            <a:off x="4392168" y="3132582"/>
-            <a:ext cx="8351520" cy="5219700"/>
+            <a:off x="4429375" y="3132582"/>
+            <a:ext cx="8357842" cy="4701602"/>
           </a:xfrm>
           <a:prstGeom prst="rect">
             <a:avLst/>
@@ -3173,7 +3173,7 @@
         </p:nvSpPr>
         <p:spPr>
           <a:xfrm>
-            <a:off x="2331339" y="2255518"/>
+            <a:off x="2677328" y="2218403"/>
             <a:ext cx="2060829" cy="271273"/>
           </a:xfrm>
           <a:prstGeom prst="callout2">
@@ -3299,8 +3299,8 @@
         </p:nvSpPr>
         <p:spPr>
           <a:xfrm>
-            <a:off x="1819657" y="5052053"/>
-            <a:ext cx="2572510" cy="271273"/>
+            <a:off x="539716" y="5089168"/>
+            <a:ext cx="3889659" cy="271273"/>
           </a:xfrm>
           <a:prstGeom prst="callout2">
             <a:avLst>
@@ -3345,7 +3345,28 @@
                 <a:latin typeface="Roboto Mono" pitchFamily="2" charset="0"/>
                 <a:ea typeface="Roboto Mono" pitchFamily="2" charset="0"/>
               </a:rPr>
-              <a:t>Transcript, Tour, and Commentary</a:t>
+              <a:t>Transcript, </a:t>
+            </a:r>
+            <a:r>
+              <a:rPr lang="en-CA" dirty="0" smtClean="0">
+                <a:latin typeface="Roboto Mono" pitchFamily="2" charset="0"/>
+                <a:ea typeface="Roboto Mono" pitchFamily="2" charset="0"/>
+              </a:rPr>
+              <a:t>Milestones, </a:t>
+            </a:r>
+            <a:r>
+              <a:rPr lang="en-CA" dirty="0" smtClean="0">
+                <a:latin typeface="Roboto Mono" pitchFamily="2" charset="0"/>
+                <a:ea typeface="Roboto Mono" pitchFamily="2" charset="0"/>
+              </a:rPr>
+              <a:t>and </a:t>
+            </a:r>
+            <a:r>
+              <a:rPr lang="en-CA" dirty="0" smtClean="0">
+                <a:latin typeface="Roboto Mono" pitchFamily="2" charset="0"/>
+                <a:ea typeface="Roboto Mono" pitchFamily="2" charset="0"/>
+              </a:rPr>
+              <a:t>Commentary view selector</a:t>
             </a:r>
             <a:endParaRPr lang="en-CA" sz="1400" dirty="0">
               <a:latin typeface="Roboto Mono" pitchFamily="2" charset="0"/>
@@ -3362,7 +3383,7 @@
         </p:nvSpPr>
         <p:spPr>
           <a:xfrm>
-            <a:off x="5769864" y="8822436"/>
+            <a:off x="5926383" y="8855388"/>
             <a:ext cx="3767328" cy="271273"/>
           </a:xfrm>
           <a:prstGeom prst="callout2">
@@ -3435,7 +3456,7 @@
         </p:nvSpPr>
         <p:spPr>
           <a:xfrm>
-            <a:off x="1816609" y="7953748"/>
+            <a:off x="1819657" y="8167931"/>
             <a:ext cx="2572510" cy="271273"/>
           </a:xfrm>
           <a:prstGeom prst="callout2">
@@ -3732,6 +3753,69 @@
           </a:p>
           <a:p>
             <a:pPr algn="ctr"/>
+            <a:endParaRPr lang="en-CA" sz="1400" dirty="0">
+              <a:latin typeface="Roboto Mono" pitchFamily="2" charset="0"/>
+              <a:ea typeface="Roboto Mono" pitchFamily="2" charset="0"/>
+            </a:endParaRPr>
+          </a:p>
+        </p:txBody>
+      </p:sp>
+      <p:sp>
+        <p:nvSpPr>
+          <p:cNvPr id="16" name="Line Callout 2 (No Border) 15"/>
+          <p:cNvSpPr/>
+          <p:nvPr/>
+        </p:nvSpPr>
+        <p:spPr>
+          <a:xfrm>
+            <a:off x="5334030" y="2249871"/>
+            <a:ext cx="4773796" cy="271273"/>
+          </a:xfrm>
+          <a:prstGeom prst="callout2">
+            <a:avLst>
+              <a:gd name="adj1" fmla="val 126480"/>
+              <a:gd name="adj2" fmla="val 47727"/>
+              <a:gd name="adj3" fmla="val 229589"/>
+              <a:gd name="adj4" fmla="val 47736"/>
+              <a:gd name="adj5" fmla="val 575536"/>
+              <a:gd name="adj6" fmla="val 80214"/>
+            </a:avLst>
+          </a:prstGeom>
+          <a:noFill/>
+          <a:ln>
+            <a:solidFill>
+              <a:srgbClr val="FFFF00"/>
+            </a:solidFill>
+          </a:ln>
+        </p:spPr>
+        <p:style>
+          <a:lnRef idx="2">
+            <a:schemeClr val="accent1">
+              <a:shade val="50000"/>
+            </a:schemeClr>
+          </a:lnRef>
+          <a:fillRef idx="1">
+            <a:schemeClr val="accent1"/>
+          </a:fillRef>
+          <a:effectRef idx="0">
+            <a:schemeClr val="accent1"/>
+          </a:effectRef>
+          <a:fontRef idx="minor">
+            <a:schemeClr val="lt1"/>
+          </a:fontRef>
+        </p:style>
+        <p:txBody>
+          <a:bodyPr rtlCol="0" anchor="ctr"/>
+          <a:lstStyle/>
+          <a:p>
+            <a:pPr algn="ctr"/>
+            <a:r>
+              <a:rPr lang="en-CA" dirty="0" smtClean="0">
+                <a:latin typeface="Roboto Mono" pitchFamily="2" charset="0"/>
+                <a:ea typeface="Roboto Mono" pitchFamily="2" charset="0"/>
+              </a:rPr>
+              <a:t>Photography, MOCR audio, and Astromaterials view selector</a:t>
+            </a:r>
             <a:endParaRPr lang="en-CA" sz="1400" dirty="0">
               <a:latin typeface="Roboto Mono" pitchFamily="2" charset="0"/>
               <a:ea typeface="Roboto Mono" pitchFamily="2" charset="0"/>
@@ -3779,7 +3863,7 @@
       </p:grpSpPr>
       <p:pic>
         <p:nvPicPr>
-          <p:cNvPr id="5" name="Picture 4"/>
+          <p:cNvPr id="16" name="Picture 15"/>
           <p:cNvPicPr>
             <a:picLocks noChangeAspect="1"/>
           </p:cNvPicPr>
@@ -3793,8 +3877,8 @@
         </p:blipFill>
         <p:spPr>
           <a:xfrm>
-            <a:off x="4392168" y="3132582"/>
-            <a:ext cx="8351520" cy="5219700"/>
+            <a:off x="4429375" y="3132582"/>
+            <a:ext cx="8357842" cy="4701602"/>
           </a:xfrm>
           <a:prstGeom prst="rect">
             <a:avLst/>
@@ -3857,10 +3941,6 @@
               </a:rPr>
               <a:t>Mission Navigator</a:t>
             </a:r>
-            <a:endParaRPr lang="en-CA" dirty="0" smtClean="0">
-              <a:latin typeface="Roboto Slab" pitchFamily="2" charset="0"/>
-              <a:ea typeface="Roboto Slab" pitchFamily="2" charset="0"/>
-            </a:endParaRPr>
           </a:p>
           <a:p>
             <a:pPr algn="ctr"/>
@@ -3886,8 +3966,8 @@
         </p:nvSpPr>
         <p:spPr>
           <a:xfrm>
-            <a:off x="9342001" y="2375562"/>
-            <a:ext cx="2060829" cy="704089"/>
+            <a:off x="8816211" y="2368310"/>
+            <a:ext cx="3095718" cy="704089"/>
           </a:xfrm>
           <a:prstGeom prst="callout2">
             <a:avLst>
@@ -3895,8 +3975,8 @@
               <a:gd name="adj2" fmla="val 50210"/>
               <a:gd name="adj3" fmla="val 124671"/>
               <a:gd name="adj4" fmla="val 50423"/>
-              <a:gd name="adj5" fmla="val 292634"/>
-              <a:gd name="adj6" fmla="val 1815"/>
+              <a:gd name="adj5" fmla="val 209564"/>
+              <a:gd name="adj6" fmla="val 11129"/>
             </a:avLst>
           </a:prstGeom>
           <a:noFill/>
@@ -3932,12 +4012,8 @@
                 <a:latin typeface="Roboto Slab" pitchFamily="2" charset="0"/>
                 <a:ea typeface="Roboto Slab" pitchFamily="2" charset="0"/>
               </a:rPr>
-              <a:t>Timed Mission Photography</a:t>
-            </a:r>
-            <a:endParaRPr lang="en-CA" sz="1400" dirty="0">
-              <a:latin typeface="Roboto Slab" pitchFamily="2" charset="0"/>
-              <a:ea typeface="Roboto Slab" pitchFamily="2" charset="0"/>
-            </a:endParaRPr>
+              <a:t>Photography, MOCR Audio, and Astromaterials</a:t>
+            </a:r>
           </a:p>
         </p:txBody>
       </p:sp>
@@ -4075,7 +4151,7 @@
         </p:nvSpPr>
         <p:spPr>
           <a:xfrm>
-            <a:off x="7379019" y="2016877"/>
+            <a:off x="7166037" y="1914035"/>
             <a:ext cx="2572510" cy="271273"/>
           </a:xfrm>
           <a:prstGeom prst="callout2">
@@ -4084,8 +4160,8 @@
               <a:gd name="adj2" fmla="val 47727"/>
               <a:gd name="adj3" fmla="val 229589"/>
               <a:gd name="adj4" fmla="val 47736"/>
-              <a:gd name="adj5" fmla="val 1498462"/>
-              <a:gd name="adj6" fmla="val -68589"/>
+              <a:gd name="adj5" fmla="val 1616894"/>
+              <a:gd name="adj6" fmla="val -65387"/>
             </a:avLst>
           </a:prstGeom>
           <a:noFill/>
@@ -4138,7 +4214,7 @@
         </p:nvSpPr>
         <p:spPr>
           <a:xfrm>
-            <a:off x="5769864" y="8822436"/>
+            <a:off x="5909907" y="8821960"/>
             <a:ext cx="3767328" cy="271273"/>
           </a:xfrm>
           <a:prstGeom prst="callout2">
@@ -4220,8 +4296,8 @@
               <a:gd name="adj2" fmla="val 50215"/>
               <a:gd name="adj3" fmla="val -171533"/>
               <a:gd name="adj4" fmla="val 50224"/>
-              <a:gd name="adj5" fmla="val -1321096"/>
-              <a:gd name="adj6" fmla="val 110702"/>
+              <a:gd name="adj5" fmla="val -1248215"/>
+              <a:gd name="adj6" fmla="val 114545"/>
             </a:avLst>
           </a:prstGeom>
           <a:noFill/>

</xml_diff>